<commit_message>
Added a video for 3rd lesson
</commit_message>
<xml_diff>
--- a/lesson 3/Lesson_3_presentation.pptx
+++ b/lesson 3/Lesson_3_presentation.pptx
@@ -5,7 +5,7 @@
     <p:sldMasterId id="2147483648" r:id="rId1"/>
   </p:sldMasterIdLst>
   <p:notesMasterIdLst>
-    <p:notesMasterId r:id="rId21"/>
+    <p:notesMasterId r:id="rId20"/>
   </p:notesMasterIdLst>
   <p:sldIdLst>
     <p:sldId id="256" r:id="rId2"/>
@@ -26,7 +26,6 @@
     <p:sldId id="269" r:id="rId17"/>
     <p:sldId id="270" r:id="rId18"/>
     <p:sldId id="271" r:id="rId19"/>
-    <p:sldId id="272" r:id="rId20"/>
   </p:sldIdLst>
   <p:sldSz cx="12192000" cy="6858000"/>
   <p:notesSz cx="6858000" cy="9144000"/>
@@ -140,7 +139,7 @@
     <p1510:client id="{58A5EECA-69F4-A2C6-FD0E-DB58BAABE3E1}" v="170" dt="2021-12-08T11:52:11.015"/>
     <p1510:client id="{C89ACF45-C2F8-E76F-58EF-8272F11558CB}" v="235" dt="2021-12-02T10:05:05.975"/>
     <p1510:client id="{E143B352-6C6B-8238-531D-573B4674CE9C}" v="2349" dt="2021-12-07T09:23:16.743"/>
-    <p1510:client id="{F9FDEF32-B02D-9891-9866-865D2425718E}" v="1664" dt="2021-12-13T05:09:53.488"/>
+    <p1510:client id="{F9FDEF32-B02D-9891-9866-865D2425718E}" v="1665" dt="2021-12-13T06:18:49.420"/>
   </p1510:revLst>
 </p1510:revInfo>
 </file>
@@ -14536,400 +14535,6 @@
 </p:sld>
 </file>
 
-<file path=ppt/slides/slide19.xml><?xml version="1.0" encoding="utf-8"?>
-<p:sld xmlns:a="http://schemas.openxmlformats.org/drawingml/2006/main" xmlns:r="http://schemas.openxmlformats.org/officeDocument/2006/relationships" xmlns:p="http://schemas.openxmlformats.org/presentationml/2006/main">
-  <p:cSld>
-    <p:spTree>
-      <p:nvGrpSpPr>
-        <p:cNvPr id="1" name=""/>
-        <p:cNvGrpSpPr/>
-        <p:nvPr/>
-      </p:nvGrpSpPr>
-      <p:grpSpPr>
-        <a:xfrm>
-          <a:off x="0" y="0"/>
-          <a:ext cx="0" cy="0"/>
-          <a:chOff x="0" y="0"/>
-          <a:chExt cx="0" cy="0"/>
-        </a:xfrm>
-      </p:grpSpPr>
-      <p:sp>
-        <p:nvSpPr>
-          <p:cNvPr id="3" name="Прямоугольник 4">
-            <a:extLst>
-              <a:ext uri="{FF2B5EF4-FFF2-40B4-BE49-F238E27FC236}">
-                <a16:creationId xmlns:a16="http://schemas.microsoft.com/office/drawing/2014/main" id="{4B36E963-03E0-4EF9-8ABB-5B0CEA42C8D6}"/>
-              </a:ext>
-            </a:extLst>
-          </p:cNvPr>
-          <p:cNvSpPr/>
-          <p:nvPr/>
-        </p:nvSpPr>
-        <p:spPr>
-          <a:xfrm>
-            <a:off x="569167" y="242596"/>
-            <a:ext cx="11150082" cy="811763"/>
-          </a:xfrm>
-          <a:prstGeom prst="rect">
-            <a:avLst/>
-          </a:prstGeom>
-        </p:spPr>
-        <p:style>
-          <a:lnRef idx="2">
-            <a:schemeClr val="accent1">
-              <a:shade val="50000"/>
-            </a:schemeClr>
-          </a:lnRef>
-          <a:fillRef idx="1">
-            <a:schemeClr val="accent1"/>
-          </a:fillRef>
-          <a:effectRef idx="0">
-            <a:schemeClr val="accent1"/>
-          </a:effectRef>
-          <a:fontRef idx="minor">
-            <a:schemeClr val="lt1"/>
-          </a:fontRef>
-        </p:style>
-        <p:txBody>
-          <a:bodyPr lIns="91440" tIns="45720" rIns="91440" bIns="45720" rtlCol="0" anchor="ctr"/>
-          <a:lstStyle/>
-          <a:p>
-            <a:pPr algn="ctr"/>
-            <a:r>
-              <a:rPr lang="ru-RU" sz="3200" b="1" dirty="0">
-                <a:ln w="12700" cmpd="sng">
-                  <a:solidFill>
-                    <a:srgbClr val="FFC000"/>
-                  </a:solidFill>
-                  <a:prstDash val="solid"/>
-                </a:ln>
-                <a:solidFill>
-                  <a:srgbClr val="FFC000"/>
-                </a:solidFill>
-                <a:cs typeface="Calibri"/>
-              </a:rPr>
-              <a:t>Выражения</a:t>
-            </a:r>
-          </a:p>
-        </p:txBody>
-      </p:sp>
-      <p:sp>
-        <p:nvSpPr>
-          <p:cNvPr id="5" name="TextBox 4">
-            <a:extLst>
-              <a:ext uri="{FF2B5EF4-FFF2-40B4-BE49-F238E27FC236}">
-                <a16:creationId xmlns:a16="http://schemas.microsoft.com/office/drawing/2014/main" id="{0A1370AC-44ED-4769-BBC2-B6765DF02BB0}"/>
-              </a:ext>
-            </a:extLst>
-          </p:cNvPr>
-          <p:cNvSpPr txBox="1"/>
-          <p:nvPr/>
-        </p:nvSpPr>
-        <p:spPr>
-          <a:xfrm>
-            <a:off x="719015" y="3981939"/>
-            <a:ext cx="2743199" cy="369332"/>
-          </a:xfrm>
-          <a:prstGeom prst="rect">
-            <a:avLst/>
-          </a:prstGeom>
-          <a:noFill/>
-        </p:spPr>
-        <p:txBody>
-          <a:bodyPr rot="0" spcFirstLastPara="0" vertOverflow="overflow" horzOverflow="overflow" vert="horz" wrap="square" lIns="91440" tIns="45720" rIns="91440" bIns="45720" numCol="1" spcCol="0" rtlCol="0" fromWordArt="0" anchor="t" anchorCtr="0" forceAA="0" compatLnSpc="1">
-            <a:prstTxWarp prst="textNoShape">
-              <a:avLst/>
-            </a:prstTxWarp>
-            <a:spAutoFit/>
-          </a:bodyPr>
-          <a:lstStyle/>
-          <a:p>
-            <a:pPr algn="l"/>
-            <a:r>
-              <a:rPr lang="en-US" b="1" dirty="0" err="1">
-                <a:cs typeface="Calibri"/>
-              </a:rPr>
-              <a:t>Вывод</a:t>
-            </a:r>
-            <a:r>
-              <a:rPr lang="en-US" b="1" dirty="0">
-                <a:cs typeface="Calibri"/>
-              </a:rPr>
-              <a:t>:</a:t>
-            </a:r>
-          </a:p>
-        </p:txBody>
-      </p:sp>
-      <p:sp>
-        <p:nvSpPr>
-          <p:cNvPr id="6" name="TextBox 5">
-            <a:extLst>
-              <a:ext uri="{FF2B5EF4-FFF2-40B4-BE49-F238E27FC236}">
-                <a16:creationId xmlns:a16="http://schemas.microsoft.com/office/drawing/2014/main" id="{5391374B-B5B2-434B-9F9F-09751293F2DF}"/>
-              </a:ext>
-            </a:extLst>
-          </p:cNvPr>
-          <p:cNvSpPr txBox="1"/>
-          <p:nvPr/>
-        </p:nvSpPr>
-        <p:spPr>
-          <a:xfrm>
-            <a:off x="754429" y="1623890"/>
-            <a:ext cx="2743199" cy="369332"/>
-          </a:xfrm>
-          <a:prstGeom prst="rect">
-            <a:avLst/>
-          </a:prstGeom>
-          <a:noFill/>
-        </p:spPr>
-        <p:txBody>
-          <a:bodyPr rot="0" spcFirstLastPara="0" vertOverflow="overflow" horzOverflow="overflow" vert="horz" wrap="square" lIns="91440" tIns="45720" rIns="91440" bIns="45720" numCol="1" spcCol="0" rtlCol="0" fromWordArt="0" anchor="t" anchorCtr="0" forceAA="0" compatLnSpc="1">
-            <a:prstTxWarp prst="textNoShape">
-              <a:avLst/>
-            </a:prstTxWarp>
-            <a:spAutoFit/>
-          </a:bodyPr>
-          <a:lstStyle/>
-          <a:p>
-            <a:r>
-              <a:rPr lang="en-US" b="1" dirty="0" err="1"/>
-              <a:t>Код</a:t>
-            </a:r>
-            <a:r>
-              <a:rPr lang="en-US" b="1" dirty="0"/>
-              <a:t>:</a:t>
-            </a:r>
-            <a:endParaRPr lang="en-US" b="1" dirty="0">
-              <a:cs typeface="Calibri"/>
-            </a:endParaRPr>
-          </a:p>
-        </p:txBody>
-      </p:sp>
-      <p:pic>
-        <p:nvPicPr>
-          <p:cNvPr id="8" name="Picture 8">
-            <a:extLst>
-              <a:ext uri="{FF2B5EF4-FFF2-40B4-BE49-F238E27FC236}">
-                <a16:creationId xmlns:a16="http://schemas.microsoft.com/office/drawing/2014/main" id="{8F033521-D56F-42AC-9611-9CBFF3C03599}"/>
-              </a:ext>
-            </a:extLst>
-          </p:cNvPr>
-          <p:cNvPicPr>
-            <a:picLocks noChangeAspect="1"/>
-          </p:cNvPicPr>
-          <p:nvPr/>
-        </p:nvPicPr>
-        <p:blipFill>
-          <a:blip r:embed="rId2"/>
-          <a:stretch>
-            <a:fillRect/>
-          </a:stretch>
-        </p:blipFill>
-        <p:spPr>
-          <a:xfrm>
-            <a:off x="1515817" y="4815010"/>
-            <a:ext cx="2732209" cy="901211"/>
-          </a:xfrm>
-          <a:prstGeom prst="rect">
-            <a:avLst/>
-          </a:prstGeom>
-        </p:spPr>
-      </p:pic>
-      <p:sp>
-        <p:nvSpPr>
-          <p:cNvPr id="9" name="TextBox 8">
-            <a:extLst>
-              <a:ext uri="{FF2B5EF4-FFF2-40B4-BE49-F238E27FC236}">
-                <a16:creationId xmlns:a16="http://schemas.microsoft.com/office/drawing/2014/main" id="{B4606CB9-7B95-40F0-BDA9-3561555C4EA7}"/>
-              </a:ext>
-            </a:extLst>
-          </p:cNvPr>
-          <p:cNvSpPr txBox="1"/>
-          <p:nvPr/>
-        </p:nvSpPr>
-        <p:spPr>
-          <a:xfrm>
-            <a:off x="6361967" y="1623890"/>
-            <a:ext cx="2743199" cy="369332"/>
-          </a:xfrm>
-          <a:prstGeom prst="rect">
-            <a:avLst/>
-          </a:prstGeom>
-          <a:noFill/>
-        </p:spPr>
-        <p:txBody>
-          <a:bodyPr rot="0" spcFirstLastPara="0" vertOverflow="overflow" horzOverflow="overflow" vert="horz" wrap="square" lIns="91440" tIns="45720" rIns="91440" bIns="45720" numCol="1" spcCol="0" rtlCol="0" fromWordArt="0" anchor="t" anchorCtr="0" forceAA="0" compatLnSpc="1">
-            <a:prstTxWarp prst="textNoShape">
-              <a:avLst/>
-            </a:prstTxWarp>
-            <a:spAutoFit/>
-          </a:bodyPr>
-          <a:lstStyle/>
-          <a:p>
-            <a:r>
-              <a:rPr lang="en-US" b="1" dirty="0" err="1"/>
-              <a:t>Код</a:t>
-            </a:r>
-            <a:r>
-              <a:rPr lang="en-US" b="1" dirty="0"/>
-              <a:t>:</a:t>
-            </a:r>
-            <a:endParaRPr lang="en-US" b="1" dirty="0">
-              <a:cs typeface="Calibri"/>
-            </a:endParaRPr>
-          </a:p>
-        </p:txBody>
-      </p:sp>
-      <p:sp>
-        <p:nvSpPr>
-          <p:cNvPr id="11" name="TextBox 10">
-            <a:extLst>
-              <a:ext uri="{FF2B5EF4-FFF2-40B4-BE49-F238E27FC236}">
-                <a16:creationId xmlns:a16="http://schemas.microsoft.com/office/drawing/2014/main" id="{250A8D7C-D5FE-46E7-B782-698BC20DB562}"/>
-              </a:ext>
-            </a:extLst>
-          </p:cNvPr>
-          <p:cNvSpPr txBox="1"/>
-          <p:nvPr/>
-        </p:nvSpPr>
-        <p:spPr>
-          <a:xfrm>
-            <a:off x="6365629" y="3981939"/>
-            <a:ext cx="2743199" cy="369332"/>
-          </a:xfrm>
-          <a:prstGeom prst="rect">
-            <a:avLst/>
-          </a:prstGeom>
-          <a:noFill/>
-        </p:spPr>
-        <p:txBody>
-          <a:bodyPr rot="0" spcFirstLastPara="0" vertOverflow="overflow" horzOverflow="overflow" vert="horz" wrap="square" lIns="91440" tIns="45720" rIns="91440" bIns="45720" numCol="1" spcCol="0" rtlCol="0" fromWordArt="0" anchor="t" anchorCtr="0" forceAA="0" compatLnSpc="1">
-            <a:prstTxWarp prst="textNoShape">
-              <a:avLst/>
-            </a:prstTxWarp>
-            <a:spAutoFit/>
-          </a:bodyPr>
-          <a:lstStyle/>
-          <a:p>
-            <a:pPr algn="l"/>
-            <a:r>
-              <a:rPr lang="en-US" b="1" dirty="0" err="1">
-                <a:cs typeface="Calibri"/>
-              </a:rPr>
-              <a:t>Вывод</a:t>
-            </a:r>
-            <a:r>
-              <a:rPr lang="en-US" b="1" dirty="0">
-                <a:cs typeface="Calibri"/>
-              </a:rPr>
-              <a:t>:</a:t>
-            </a:r>
-          </a:p>
-        </p:txBody>
-      </p:sp>
-      <p:pic>
-        <p:nvPicPr>
-          <p:cNvPr id="13" name="Picture 13">
-            <a:extLst>
-              <a:ext uri="{FF2B5EF4-FFF2-40B4-BE49-F238E27FC236}">
-                <a16:creationId xmlns:a16="http://schemas.microsoft.com/office/drawing/2014/main" id="{FC63D314-3DB8-451B-9E0B-01346CC03F7C}"/>
-              </a:ext>
-            </a:extLst>
-          </p:cNvPr>
-          <p:cNvPicPr>
-            <a:picLocks noChangeAspect="1"/>
-          </p:cNvPicPr>
-          <p:nvPr/>
-        </p:nvPicPr>
-        <p:blipFill>
-          <a:blip r:embed="rId3"/>
-          <a:stretch>
-            <a:fillRect/>
-          </a:stretch>
-        </p:blipFill>
-        <p:spPr>
-          <a:xfrm>
-            <a:off x="6815015" y="2237401"/>
-            <a:ext cx="4921738" cy="1122966"/>
-          </a:xfrm>
-          <a:prstGeom prst="rect">
-            <a:avLst/>
-          </a:prstGeom>
-        </p:spPr>
-      </p:pic>
-      <p:pic>
-        <p:nvPicPr>
-          <p:cNvPr id="14" name="Picture 14">
-            <a:extLst>
-              <a:ext uri="{FF2B5EF4-FFF2-40B4-BE49-F238E27FC236}">
-                <a16:creationId xmlns:a16="http://schemas.microsoft.com/office/drawing/2014/main" id="{AA9D9F2D-5384-4F83-8C1B-69CE575885CA}"/>
-              </a:ext>
-            </a:extLst>
-          </p:cNvPr>
-          <p:cNvPicPr>
-            <a:picLocks noChangeAspect="1"/>
-          </p:cNvPicPr>
-          <p:nvPr/>
-        </p:nvPicPr>
-        <p:blipFill>
-          <a:blip r:embed="rId4"/>
-          <a:stretch>
-            <a:fillRect/>
-          </a:stretch>
-        </p:blipFill>
-        <p:spPr>
-          <a:xfrm>
-            <a:off x="6815015" y="4811427"/>
-            <a:ext cx="4032738" cy="527376"/>
-          </a:xfrm>
-          <a:prstGeom prst="rect">
-            <a:avLst/>
-          </a:prstGeom>
-        </p:spPr>
-      </p:pic>
-      <p:pic>
-        <p:nvPicPr>
-          <p:cNvPr id="2" name="Picture 3">
-            <a:extLst>
-              <a:ext uri="{FF2B5EF4-FFF2-40B4-BE49-F238E27FC236}">
-                <a16:creationId xmlns:a16="http://schemas.microsoft.com/office/drawing/2014/main" id="{5372CF20-53D9-4028-B85F-891C16BB4E11}"/>
-              </a:ext>
-            </a:extLst>
-          </p:cNvPr>
-          <p:cNvPicPr>
-            <a:picLocks noChangeAspect="1"/>
-          </p:cNvPicPr>
-          <p:nvPr/>
-        </p:nvPicPr>
-        <p:blipFill>
-          <a:blip r:embed="rId5"/>
-          <a:stretch>
-            <a:fillRect/>
-          </a:stretch>
-        </p:blipFill>
-        <p:spPr>
-          <a:xfrm>
-            <a:off x="887819" y="2163749"/>
-            <a:ext cx="4922874" cy="1263455"/>
-          </a:xfrm>
-          <a:prstGeom prst="rect">
-            <a:avLst/>
-          </a:prstGeom>
-        </p:spPr>
-      </p:pic>
-    </p:spTree>
-    <p:extLst>
-      <p:ext uri="{BB962C8B-B14F-4D97-AF65-F5344CB8AC3E}">
-        <p14:creationId xmlns:p14="http://schemas.microsoft.com/office/powerpoint/2010/main" val="3602214975"/>
-      </p:ext>
-    </p:extLst>
-  </p:cSld>
-  <p:clrMapOvr>
-    <a:masterClrMapping/>
-  </p:clrMapOvr>
-</p:sld>
-</file>
-
 <file path=ppt/slides/slide2.xml><?xml version="1.0" encoding="utf-8"?>
 <p:sld xmlns:a="http://schemas.openxmlformats.org/drawingml/2006/main" xmlns:r="http://schemas.openxmlformats.org/officeDocument/2006/relationships" xmlns:p="http://schemas.openxmlformats.org/presentationml/2006/main">
   <p:cSld>

</xml_diff>